<commit_message>
fixed vagrantfile connections and updated drawing
</commit_message>
<xml_diff>
--- a/T_Foundry_Plano_diagram.pptx
+++ b/T_Foundry_Plano_diagram.pptx
@@ -105,6 +105,11 @@
       </a:defRPr>
     </a:lvl9pPr>
   </p:defaultTextStyle>
+  <p:extLst>
+    <p:ext uri="{EFAFB233-063F-42B5-8137-9DF3F51BA10A}">
+      <p15:sldGuideLst xmlns:p15="http://schemas.microsoft.com/office/powerpoint/2012/main"/>
+    </p:ext>
+  </p:extLst>
 </p:presentation>
 </file>
 
@@ -239,7 +244,7 @@
           <a:p>
             <a:fld id="{8B61B6C6-8986-3A4C-98B0-AC6E02DE17D9}" type="datetimeFigureOut">
               <a:rPr lang="en-US" smtClean="0"/>
-              <a:t>7/29/16</a:t>
+              <a:t>7/31/16</a:t>
             </a:fld>
             <a:endParaRPr lang="en-US"/>
           </a:p>
@@ -409,7 +414,7 @@
           <a:p>
             <a:fld id="{8B61B6C6-8986-3A4C-98B0-AC6E02DE17D9}" type="datetimeFigureOut">
               <a:rPr lang="en-US" smtClean="0"/>
-              <a:t>7/29/16</a:t>
+              <a:t>7/31/16</a:t>
             </a:fld>
             <a:endParaRPr lang="en-US"/>
           </a:p>
@@ -589,7 +594,7 @@
           <a:p>
             <a:fld id="{8B61B6C6-8986-3A4C-98B0-AC6E02DE17D9}" type="datetimeFigureOut">
               <a:rPr lang="en-US" smtClean="0"/>
-              <a:t>7/29/16</a:t>
+              <a:t>7/31/16</a:t>
             </a:fld>
             <a:endParaRPr lang="en-US"/>
           </a:p>
@@ -684,7 +689,7 @@
           <a:p>
             <a:fld id="{2258ED9C-6495-9240-B4CA-B386709EE741}" type="datetime4">
               <a:rPr lang="en-US" smtClean="0"/>
-              <a:t>July 29, 2016</a:t>
+              <a:t>July 31, 2016</a:t>
             </a:fld>
             <a:endParaRPr lang="en-US"/>
           </a:p>
@@ -1051,7 +1056,7 @@
           <a:p>
             <a:fld id="{8B61B6C6-8986-3A4C-98B0-AC6E02DE17D9}" type="datetimeFigureOut">
               <a:rPr lang="en-US" smtClean="0"/>
-              <a:t>7/29/16</a:t>
+              <a:t>7/31/16</a:t>
             </a:fld>
             <a:endParaRPr lang="en-US"/>
           </a:p>
@@ -1297,7 +1302,7 @@
           <a:p>
             <a:fld id="{8B61B6C6-8986-3A4C-98B0-AC6E02DE17D9}" type="datetimeFigureOut">
               <a:rPr lang="en-US" smtClean="0"/>
-              <a:t>7/29/16</a:t>
+              <a:t>7/31/16</a:t>
             </a:fld>
             <a:endParaRPr lang="en-US"/>
           </a:p>
@@ -1529,7 +1534,7 @@
           <a:p>
             <a:fld id="{8B61B6C6-8986-3A4C-98B0-AC6E02DE17D9}" type="datetimeFigureOut">
               <a:rPr lang="en-US" smtClean="0"/>
-              <a:t>7/29/16</a:t>
+              <a:t>7/31/16</a:t>
             </a:fld>
             <a:endParaRPr lang="en-US"/>
           </a:p>
@@ -1896,7 +1901,7 @@
           <a:p>
             <a:fld id="{8B61B6C6-8986-3A4C-98B0-AC6E02DE17D9}" type="datetimeFigureOut">
               <a:rPr lang="en-US" smtClean="0"/>
-              <a:t>7/29/16</a:t>
+              <a:t>7/31/16</a:t>
             </a:fld>
             <a:endParaRPr lang="en-US"/>
           </a:p>
@@ -2014,7 +2019,7 @@
           <a:p>
             <a:fld id="{8B61B6C6-8986-3A4C-98B0-AC6E02DE17D9}" type="datetimeFigureOut">
               <a:rPr lang="en-US" smtClean="0"/>
-              <a:t>7/29/16</a:t>
+              <a:t>7/31/16</a:t>
             </a:fld>
             <a:endParaRPr lang="en-US"/>
           </a:p>
@@ -2109,7 +2114,7 @@
           <a:p>
             <a:fld id="{8B61B6C6-8986-3A4C-98B0-AC6E02DE17D9}" type="datetimeFigureOut">
               <a:rPr lang="en-US" smtClean="0"/>
-              <a:t>7/29/16</a:t>
+              <a:t>7/31/16</a:t>
             </a:fld>
             <a:endParaRPr lang="en-US"/>
           </a:p>
@@ -2386,7 +2391,7 @@
           <a:p>
             <a:fld id="{8B61B6C6-8986-3A4C-98B0-AC6E02DE17D9}" type="datetimeFigureOut">
               <a:rPr lang="en-US" smtClean="0"/>
-              <a:t>7/29/16</a:t>
+              <a:t>7/31/16</a:t>
             </a:fld>
             <a:endParaRPr lang="en-US"/>
           </a:p>
@@ -2639,7 +2644,7 @@
           <a:p>
             <a:fld id="{8B61B6C6-8986-3A4C-98B0-AC6E02DE17D9}" type="datetimeFigureOut">
               <a:rPr lang="en-US" smtClean="0"/>
-              <a:t>7/29/16</a:t>
+              <a:t>7/31/16</a:t>
             </a:fld>
             <a:endParaRPr lang="en-US"/>
           </a:p>
@@ -2852,7 +2857,7 @@
           <a:p>
             <a:fld id="{8B61B6C6-8986-3A4C-98B0-AC6E02DE17D9}" type="datetimeFigureOut">
               <a:rPr lang="en-US" smtClean="0"/>
-              <a:t>7/29/16</a:t>
+              <a:t>7/31/16</a:t>
             </a:fld>
             <a:endParaRPr lang="en-US"/>
           </a:p>
@@ -5801,14 +5806,14 @@
           <a:effectLst/>
           <a:extLst>
             <a:ext uri="{909E8E84-426E-40dd-AFC4-6F175D3DCCD1}">
-              <a14:hiddenFill xmlns:a14="http://schemas.microsoft.com/office/drawing/2010/main" xmlns="">
+              <a14:hiddenFill xmlns="" xmlns:a14="http://schemas.microsoft.com/office/drawing/2010/main">
                 <a:solidFill>
                   <a:srgbClr val="FFFFFF"/>
                 </a:solidFill>
               </a14:hiddenFill>
             </a:ext>
             <a:ext uri="{91240B29-F687-4f45-9708-019B960494DF}">
-              <a14:hiddenLine xmlns:a14="http://schemas.microsoft.com/office/drawing/2010/main" xmlns="" w="9525">
+              <a14:hiddenLine xmlns="" xmlns:a14="http://schemas.microsoft.com/office/drawing/2010/main" w="9525">
                 <a:solidFill>
                   <a:srgbClr val="3465AF"/>
                 </a:solidFill>
@@ -5818,7 +5823,7 @@
               </a14:hiddenLine>
             </a:ext>
             <a:ext uri="{AF507438-7753-43e0-B8FC-AC1667EBCBE1}">
-              <a14:hiddenEffects xmlns:a14="http://schemas.microsoft.com/office/drawing/2010/main" xmlns="">
+              <a14:hiddenEffects xmlns="" xmlns:a14="http://schemas.microsoft.com/office/drawing/2010/main">
                 <a:effectLst>
                   <a:outerShdw blurRad="63500" dist="38099" dir="2700000" algn="ctr" rotWithShape="0">
                     <a:srgbClr val="000000">
@@ -6253,20 +6258,6 @@
               </a:rPr>
               <a:t>MDC1-19-OCP-SPINEA</a:t>
             </a:r>
-            <a:endParaRPr lang="en-US" sz="1200" dirty="0">
-              <a:solidFill>
-                <a:schemeClr val="tx1"/>
-              </a:solidFill>
-              <a:effectLst>
-                <a:outerShdw blurRad="38100" dist="38100" dir="2700000" algn="tl">
-                  <a:srgbClr val="000000">
-                    <a:alpha val="43137"/>
-                  </a:srgbClr>
-                </a:outerShdw>
-              </a:effectLst>
-              <a:latin typeface="Franklin Gothic Book"/>
-              <a:cs typeface="DejaVu Sans" charset="0"/>
-            </a:endParaRPr>
           </a:p>
         </p:txBody>
       </p:sp>
@@ -6293,14 +6284,14 @@
           <a:effectLst/>
           <a:extLst>
             <a:ext uri="{909E8E84-426E-40dd-AFC4-6F175D3DCCD1}">
-              <a14:hiddenFill xmlns:a14="http://schemas.microsoft.com/office/drawing/2010/main" xmlns="">
+              <a14:hiddenFill xmlns="" xmlns:a14="http://schemas.microsoft.com/office/drawing/2010/main">
                 <a:solidFill>
                   <a:srgbClr val="FFFFFF"/>
                 </a:solidFill>
               </a14:hiddenFill>
             </a:ext>
             <a:ext uri="{91240B29-F687-4f45-9708-019B960494DF}">
-              <a14:hiddenLine xmlns:a14="http://schemas.microsoft.com/office/drawing/2010/main" xmlns="" w="9525">
+              <a14:hiddenLine xmlns="" xmlns:a14="http://schemas.microsoft.com/office/drawing/2010/main" w="9525">
                 <a:solidFill>
                   <a:srgbClr val="3465AF"/>
                 </a:solidFill>
@@ -6310,7 +6301,7 @@
               </a14:hiddenLine>
             </a:ext>
             <a:ext uri="{AF507438-7753-43e0-B8FC-AC1667EBCBE1}">
-              <a14:hiddenEffects xmlns:a14="http://schemas.microsoft.com/office/drawing/2010/main" xmlns="">
+              <a14:hiddenEffects xmlns="" xmlns:a14="http://schemas.microsoft.com/office/drawing/2010/main">
                 <a:effectLst>
                   <a:outerShdw blurRad="63500" dist="38099" dir="2700000" algn="ctr" rotWithShape="0">
                     <a:srgbClr val="000000">
@@ -6745,20 +6736,6 @@
               </a:rPr>
               <a:t>MDC1-22-OCP-ACCESSA</a:t>
             </a:r>
-            <a:endParaRPr lang="en-US" sz="1200" dirty="0">
-              <a:solidFill>
-                <a:schemeClr val="tx1"/>
-              </a:solidFill>
-              <a:effectLst>
-                <a:outerShdw blurRad="38100" dist="38100" dir="2700000" algn="tl">
-                  <a:srgbClr val="000000">
-                    <a:alpha val="43137"/>
-                  </a:srgbClr>
-                </a:outerShdw>
-              </a:effectLst>
-              <a:latin typeface="Franklin Gothic Book"/>
-              <a:cs typeface="DejaVu Sans" charset="0"/>
-            </a:endParaRPr>
           </a:p>
         </p:txBody>
       </p:sp>
@@ -6785,14 +6762,14 @@
           <a:effectLst/>
           <a:extLst>
             <a:ext uri="{909E8E84-426E-40dd-AFC4-6F175D3DCCD1}">
-              <a14:hiddenFill xmlns:a14="http://schemas.microsoft.com/office/drawing/2010/main" xmlns="">
+              <a14:hiddenFill xmlns="" xmlns:a14="http://schemas.microsoft.com/office/drawing/2010/main">
                 <a:solidFill>
                   <a:srgbClr val="FFFFFF"/>
                 </a:solidFill>
               </a14:hiddenFill>
             </a:ext>
             <a:ext uri="{91240B29-F687-4f45-9708-019B960494DF}">
-              <a14:hiddenLine xmlns:a14="http://schemas.microsoft.com/office/drawing/2010/main" xmlns="" w="9525">
+              <a14:hiddenLine xmlns="" xmlns:a14="http://schemas.microsoft.com/office/drawing/2010/main" w="9525">
                 <a:solidFill>
                   <a:srgbClr val="3465AF"/>
                 </a:solidFill>
@@ -6802,7 +6779,7 @@
               </a14:hiddenLine>
             </a:ext>
             <a:ext uri="{AF507438-7753-43e0-B8FC-AC1667EBCBE1}">
-              <a14:hiddenEffects xmlns:a14="http://schemas.microsoft.com/office/drawing/2010/main" xmlns="">
+              <a14:hiddenEffects xmlns="" xmlns:a14="http://schemas.microsoft.com/office/drawing/2010/main">
                 <a:effectLst>
                   <a:outerShdw blurRad="63500" dist="38099" dir="2700000" algn="ctr" rotWithShape="0">
                     <a:srgbClr val="000000">
@@ -7277,14 +7254,14 @@
           <a:effectLst/>
           <a:extLst>
             <a:ext uri="{909E8E84-426E-40dd-AFC4-6F175D3DCCD1}">
-              <a14:hiddenFill xmlns:a14="http://schemas.microsoft.com/office/drawing/2010/main" xmlns="">
+              <a14:hiddenFill xmlns="" xmlns:a14="http://schemas.microsoft.com/office/drawing/2010/main">
                 <a:solidFill>
                   <a:srgbClr val="FFFFFF"/>
                 </a:solidFill>
               </a14:hiddenFill>
             </a:ext>
             <a:ext uri="{91240B29-F687-4f45-9708-019B960494DF}">
-              <a14:hiddenLine xmlns:a14="http://schemas.microsoft.com/office/drawing/2010/main" xmlns="" w="9525">
+              <a14:hiddenLine xmlns="" xmlns:a14="http://schemas.microsoft.com/office/drawing/2010/main" w="9525">
                 <a:solidFill>
                   <a:srgbClr val="3465AF"/>
                 </a:solidFill>
@@ -7294,7 +7271,7 @@
               </a14:hiddenLine>
             </a:ext>
             <a:ext uri="{AF507438-7753-43e0-B8FC-AC1667EBCBE1}">
-              <a14:hiddenEffects xmlns:a14="http://schemas.microsoft.com/office/drawing/2010/main" xmlns="">
+              <a14:hiddenEffects xmlns="" xmlns:a14="http://schemas.microsoft.com/office/drawing/2010/main">
                 <a:effectLst>
                   <a:outerShdw blurRad="63500" dist="38099" dir="2700000" algn="ctr" rotWithShape="0">
                     <a:srgbClr val="000000">
@@ -7769,14 +7746,14 @@
           <a:effectLst/>
           <a:extLst>
             <a:ext uri="{909E8E84-426E-40dd-AFC4-6F175D3DCCD1}">
-              <a14:hiddenFill xmlns:a14="http://schemas.microsoft.com/office/drawing/2010/main" xmlns="">
+              <a14:hiddenFill xmlns="" xmlns:a14="http://schemas.microsoft.com/office/drawing/2010/main">
                 <a:solidFill>
                   <a:srgbClr val="FFFFFF"/>
                 </a:solidFill>
               </a14:hiddenFill>
             </a:ext>
             <a:ext uri="{91240B29-F687-4f45-9708-019B960494DF}">
-              <a14:hiddenLine xmlns:a14="http://schemas.microsoft.com/office/drawing/2010/main" xmlns="" w="9525">
+              <a14:hiddenLine xmlns="" xmlns:a14="http://schemas.microsoft.com/office/drawing/2010/main" w="9525">
                 <a:solidFill>
                   <a:srgbClr val="3465AF"/>
                 </a:solidFill>
@@ -7786,7 +7763,7 @@
               </a14:hiddenLine>
             </a:ext>
             <a:ext uri="{AF507438-7753-43e0-B8FC-AC1667EBCBE1}">
-              <a14:hiddenEffects xmlns:a14="http://schemas.microsoft.com/office/drawing/2010/main" xmlns="">
+              <a14:hiddenEffects xmlns="" xmlns:a14="http://schemas.microsoft.com/office/drawing/2010/main">
                 <a:effectLst>
                   <a:outerShdw blurRad="63500" dist="38099" dir="2700000" algn="ctr" rotWithShape="0">
                     <a:srgbClr val="000000">
@@ -8261,14 +8238,14 @@
           <a:effectLst/>
           <a:extLst>
             <a:ext uri="{909E8E84-426E-40dd-AFC4-6F175D3DCCD1}">
-              <a14:hiddenFill xmlns:a14="http://schemas.microsoft.com/office/drawing/2010/main" xmlns="">
+              <a14:hiddenFill xmlns="" xmlns:a14="http://schemas.microsoft.com/office/drawing/2010/main">
                 <a:solidFill>
                   <a:srgbClr val="FFFFFF"/>
                 </a:solidFill>
               </a14:hiddenFill>
             </a:ext>
             <a:ext uri="{91240B29-F687-4f45-9708-019B960494DF}">
-              <a14:hiddenLine xmlns:a14="http://schemas.microsoft.com/office/drawing/2010/main" xmlns="" w="9525">
+              <a14:hiddenLine xmlns="" xmlns:a14="http://schemas.microsoft.com/office/drawing/2010/main" w="9525">
                 <a:solidFill>
                   <a:srgbClr val="3465AF"/>
                 </a:solidFill>
@@ -8278,7 +8255,7 @@
               </a14:hiddenLine>
             </a:ext>
             <a:ext uri="{AF507438-7753-43e0-B8FC-AC1667EBCBE1}">
-              <a14:hiddenEffects xmlns:a14="http://schemas.microsoft.com/office/drawing/2010/main" xmlns="">
+              <a14:hiddenEffects xmlns="" xmlns:a14="http://schemas.microsoft.com/office/drawing/2010/main">
                 <a:effectLst>
                   <a:outerShdw blurRad="63500" dist="38099" dir="2700000" algn="ctr" rotWithShape="0">
                     <a:srgbClr val="000000">
@@ -8753,14 +8730,14 @@
           <a:effectLst/>
           <a:extLst>
             <a:ext uri="{909E8E84-426E-40dd-AFC4-6F175D3DCCD1}">
-              <a14:hiddenFill xmlns:a14="http://schemas.microsoft.com/office/drawing/2010/main" xmlns="">
+              <a14:hiddenFill xmlns="" xmlns:a14="http://schemas.microsoft.com/office/drawing/2010/main">
                 <a:solidFill>
                   <a:srgbClr val="FFFFFF"/>
                 </a:solidFill>
               </a14:hiddenFill>
             </a:ext>
             <a:ext uri="{91240B29-F687-4f45-9708-019B960494DF}">
-              <a14:hiddenLine xmlns:a14="http://schemas.microsoft.com/office/drawing/2010/main" xmlns="" w="9525">
+              <a14:hiddenLine xmlns="" xmlns:a14="http://schemas.microsoft.com/office/drawing/2010/main" w="9525">
                 <a:solidFill>
                   <a:srgbClr val="3465AF"/>
                 </a:solidFill>
@@ -8770,7 +8747,7 @@
               </a14:hiddenLine>
             </a:ext>
             <a:ext uri="{AF507438-7753-43e0-B8FC-AC1667EBCBE1}">
-              <a14:hiddenEffects xmlns:a14="http://schemas.microsoft.com/office/drawing/2010/main" xmlns="">
+              <a14:hiddenEffects xmlns="" xmlns:a14="http://schemas.microsoft.com/office/drawing/2010/main">
                 <a:effectLst>
                   <a:outerShdw blurRad="63500" dist="38099" dir="2700000" algn="ctr" rotWithShape="0">
                     <a:srgbClr val="000000">
@@ -9245,14 +9222,14 @@
           <a:effectLst/>
           <a:extLst>
             <a:ext uri="{909E8E84-426E-40dd-AFC4-6F175D3DCCD1}">
-              <a14:hiddenFill xmlns:a14="http://schemas.microsoft.com/office/drawing/2010/main" xmlns="">
+              <a14:hiddenFill xmlns="" xmlns:a14="http://schemas.microsoft.com/office/drawing/2010/main">
                 <a:solidFill>
                   <a:srgbClr val="FFFFFF"/>
                 </a:solidFill>
               </a14:hiddenFill>
             </a:ext>
             <a:ext uri="{91240B29-F687-4f45-9708-019B960494DF}">
-              <a14:hiddenLine xmlns:a14="http://schemas.microsoft.com/office/drawing/2010/main" xmlns="" w="9525">
+              <a14:hiddenLine xmlns="" xmlns:a14="http://schemas.microsoft.com/office/drawing/2010/main" w="9525">
                 <a:solidFill>
                   <a:srgbClr val="3465AF"/>
                 </a:solidFill>
@@ -9262,7 +9239,7 @@
               </a14:hiddenLine>
             </a:ext>
             <a:ext uri="{AF507438-7753-43e0-B8FC-AC1667EBCBE1}">
-              <a14:hiddenEffects xmlns:a14="http://schemas.microsoft.com/office/drawing/2010/main" xmlns="">
+              <a14:hiddenEffects xmlns="" xmlns:a14="http://schemas.microsoft.com/office/drawing/2010/main">
                 <a:effectLst>
                   <a:outerShdw blurRad="63500" dist="38099" dir="2700000" algn="ctr" rotWithShape="0">
                     <a:srgbClr val="000000">
@@ -9696,17 +9673,6 @@
               </a:rPr>
               <a:t>host1</a:t>
             </a:r>
-            <a:endParaRPr lang="en-US" sz="2400" b="1" dirty="0">
-              <a:effectLst>
-                <a:outerShdw blurRad="38100" dist="38100" dir="2700000" algn="tl">
-                  <a:srgbClr val="000000">
-                    <a:alpha val="43137"/>
-                  </a:srgbClr>
-                </a:outerShdw>
-              </a:effectLst>
-              <a:latin typeface="Franklin Gothic Book"/>
-              <a:cs typeface="DejaVu Sans" charset="0"/>
-            </a:endParaRPr>
           </a:p>
         </p:txBody>
       </p:sp>
@@ -9733,14 +9699,14 @@
           <a:effectLst/>
           <a:extLst>
             <a:ext uri="{909E8E84-426E-40dd-AFC4-6F175D3DCCD1}">
-              <a14:hiddenFill xmlns:a14="http://schemas.microsoft.com/office/drawing/2010/main" xmlns="">
+              <a14:hiddenFill xmlns="" xmlns:a14="http://schemas.microsoft.com/office/drawing/2010/main">
                 <a:solidFill>
                   <a:srgbClr val="FFFFFF"/>
                 </a:solidFill>
               </a14:hiddenFill>
             </a:ext>
             <a:ext uri="{91240B29-F687-4f45-9708-019B960494DF}">
-              <a14:hiddenLine xmlns:a14="http://schemas.microsoft.com/office/drawing/2010/main" xmlns="" w="9525">
+              <a14:hiddenLine xmlns="" xmlns:a14="http://schemas.microsoft.com/office/drawing/2010/main" w="9525">
                 <a:solidFill>
                   <a:srgbClr val="3465AF"/>
                 </a:solidFill>
@@ -9750,7 +9716,7 @@
               </a14:hiddenLine>
             </a:ext>
             <a:ext uri="{AF507438-7753-43e0-B8FC-AC1667EBCBE1}">
-              <a14:hiddenEffects xmlns:a14="http://schemas.microsoft.com/office/drawing/2010/main" xmlns="">
+              <a14:hiddenEffects xmlns="" xmlns:a14="http://schemas.microsoft.com/office/drawing/2010/main">
                 <a:effectLst>
                   <a:outerShdw blurRad="63500" dist="38099" dir="2700000" algn="ctr" rotWithShape="0">
                     <a:srgbClr val="000000">
@@ -10184,17 +10150,6 @@
               </a:rPr>
               <a:t>host2</a:t>
             </a:r>
-            <a:endParaRPr lang="en-US" sz="2400" b="1" dirty="0">
-              <a:effectLst>
-                <a:outerShdw blurRad="38100" dist="38100" dir="2700000" algn="tl">
-                  <a:srgbClr val="000000">
-                    <a:alpha val="43137"/>
-                  </a:srgbClr>
-                </a:outerShdw>
-              </a:effectLst>
-              <a:latin typeface="Franklin Gothic Book"/>
-              <a:cs typeface="DejaVu Sans" charset="0"/>
-            </a:endParaRPr>
           </a:p>
         </p:txBody>
       </p:sp>
@@ -10240,14 +10195,14 @@
           <a:p>
             <a:pPr algn="ctr"/>
             <a:r>
-              <a:rPr lang="en-US" sz="1067" dirty="0" err="1" smtClean="0">
+              <a:rPr lang="en-US" sz="1067" dirty="0" smtClean="0">
                 <a:solidFill>
                   <a:schemeClr val="tx1"/>
                 </a:solidFill>
                 <a:latin typeface="Franklin Gothic Book"/>
                 <a:cs typeface="Franklin Gothic Book"/>
               </a:rPr>
-              <a:t>swp</a:t>
+              <a:t>swp26</a:t>
             </a:r>
             <a:endParaRPr lang="en-US" sz="1067" dirty="0">
               <a:solidFill>
@@ -10301,14 +10256,14 @@
           <a:p>
             <a:pPr algn="ctr"/>
             <a:r>
-              <a:rPr lang="en-US" sz="1067" dirty="0" err="1" smtClean="0">
+              <a:rPr lang="en-US" sz="1067" dirty="0" smtClean="0">
                 <a:solidFill>
                   <a:schemeClr val="tx1"/>
                 </a:solidFill>
                 <a:latin typeface="Franklin Gothic Book"/>
                 <a:cs typeface="Franklin Gothic Book"/>
               </a:rPr>
-              <a:t>swp</a:t>
+              <a:t>swp37</a:t>
             </a:r>
             <a:endParaRPr lang="en-US" sz="1067" dirty="0">
               <a:solidFill>
@@ -10362,14 +10317,14 @@
           <a:p>
             <a:pPr algn="ctr"/>
             <a:r>
-              <a:rPr lang="en-US" sz="1067" dirty="0" err="1" smtClean="0">
+              <a:rPr lang="en-US" sz="1067" dirty="0" smtClean="0">
                 <a:solidFill>
                   <a:schemeClr val="tx1"/>
                 </a:solidFill>
                 <a:latin typeface="Franklin Gothic Book"/>
                 <a:cs typeface="Franklin Gothic Book"/>
               </a:rPr>
-              <a:t>swp</a:t>
+              <a:t>swp38</a:t>
             </a:r>
             <a:endParaRPr lang="en-US" sz="1067" dirty="0">
               <a:solidFill>
@@ -10423,14 +10378,14 @@
           <a:p>
             <a:pPr algn="ctr"/>
             <a:r>
-              <a:rPr lang="en-US" sz="1067" dirty="0" err="1" smtClean="0">
+              <a:rPr lang="en-US" sz="1067" dirty="0" smtClean="0">
                 <a:solidFill>
                   <a:schemeClr val="tx1"/>
                 </a:solidFill>
                 <a:latin typeface="Franklin Gothic Book"/>
                 <a:cs typeface="Franklin Gothic Book"/>
               </a:rPr>
-              <a:t>swp</a:t>
+              <a:t>swp38</a:t>
             </a:r>
             <a:endParaRPr lang="en-US" sz="1067" dirty="0">
               <a:solidFill>
@@ -10493,13 +10448,6 @@
               </a:rPr>
               <a:t>eth1</a:t>
             </a:r>
-            <a:endParaRPr lang="en-US" sz="1067" dirty="0">
-              <a:solidFill>
-                <a:schemeClr val="tx1"/>
-              </a:solidFill>
-              <a:latin typeface="Franklin Gothic Book"/>
-              <a:cs typeface="Franklin Gothic Book"/>
-            </a:endParaRPr>
           </a:p>
         </p:txBody>
       </p:sp>
@@ -10554,13 +10502,6 @@
               </a:rPr>
               <a:t>eth2</a:t>
             </a:r>
-            <a:endParaRPr lang="en-US" sz="1067" dirty="0">
-              <a:solidFill>
-                <a:schemeClr val="tx1"/>
-              </a:solidFill>
-              <a:latin typeface="Franklin Gothic Book"/>
-              <a:cs typeface="Franklin Gothic Book"/>
-            </a:endParaRPr>
           </a:p>
         </p:txBody>
       </p:sp>
@@ -10615,13 +10556,6 @@
               </a:rPr>
               <a:t>eth1</a:t>
             </a:r>
-            <a:endParaRPr lang="en-US" sz="1067" dirty="0">
-              <a:solidFill>
-                <a:schemeClr val="tx1"/>
-              </a:solidFill>
-              <a:latin typeface="Franklin Gothic Book"/>
-              <a:cs typeface="Franklin Gothic Book"/>
-            </a:endParaRPr>
           </a:p>
         </p:txBody>
       </p:sp>
@@ -10676,13 +10610,6 @@
               </a:rPr>
               <a:t>eth2</a:t>
             </a:r>
-            <a:endParaRPr lang="en-US" sz="1067" dirty="0">
-              <a:solidFill>
-                <a:schemeClr val="tx1"/>
-              </a:solidFill>
-              <a:latin typeface="Franklin Gothic Book"/>
-              <a:cs typeface="Franklin Gothic Book"/>
-            </a:endParaRPr>
           </a:p>
         </p:txBody>
       </p:sp>
@@ -10709,14 +10636,14 @@
           <a:effectLst/>
           <a:extLst>
             <a:ext uri="{909E8E84-426E-40dd-AFC4-6F175D3DCCD1}">
-              <a14:hiddenFill xmlns:a14="http://schemas.microsoft.com/office/drawing/2010/main" xmlns="">
+              <a14:hiddenFill xmlns="" xmlns:a14="http://schemas.microsoft.com/office/drawing/2010/main">
                 <a:solidFill>
                   <a:srgbClr val="FFFFFF"/>
                 </a:solidFill>
               </a14:hiddenFill>
             </a:ext>
             <a:ext uri="{91240B29-F687-4f45-9708-019B960494DF}">
-              <a14:hiddenLine xmlns:a14="http://schemas.microsoft.com/office/drawing/2010/main" xmlns="" w="9525">
+              <a14:hiddenLine xmlns="" xmlns:a14="http://schemas.microsoft.com/office/drawing/2010/main" w="9525">
                 <a:solidFill>
                   <a:srgbClr val="3465AF"/>
                 </a:solidFill>
@@ -10726,7 +10653,7 @@
               </a14:hiddenLine>
             </a:ext>
             <a:ext uri="{AF507438-7753-43e0-B8FC-AC1667EBCBE1}">
-              <a14:hiddenEffects xmlns:a14="http://schemas.microsoft.com/office/drawing/2010/main" xmlns="">
+              <a14:hiddenEffects xmlns="" xmlns:a14="http://schemas.microsoft.com/office/drawing/2010/main">
                 <a:effectLst>
                   <a:outerShdw blurRad="63500" dist="38099" dir="2700000" algn="ctr" rotWithShape="0">
                     <a:srgbClr val="000000">
@@ -11390,13 +11317,6 @@
               </a:rPr>
               <a:t>swp1</a:t>
             </a:r>
-            <a:endParaRPr lang="en-US" sz="1067" dirty="0">
-              <a:solidFill>
-                <a:schemeClr val="tx1"/>
-              </a:solidFill>
-              <a:latin typeface="Franklin Gothic Book"/>
-              <a:cs typeface="Franklin Gothic Book"/>
-            </a:endParaRPr>
           </a:p>
         </p:txBody>
       </p:sp>
@@ -11451,13 +11371,6 @@
               </a:rPr>
               <a:t>swp1</a:t>
             </a:r>
-            <a:endParaRPr lang="en-US" sz="1067" dirty="0">
-              <a:solidFill>
-                <a:schemeClr val="tx1"/>
-              </a:solidFill>
-              <a:latin typeface="Franklin Gothic Book"/>
-              <a:cs typeface="Franklin Gothic Book"/>
-            </a:endParaRPr>
           </a:p>
         </p:txBody>
       </p:sp>
@@ -11512,6 +11425,322 @@
         <p:spPr>
           <a:xfrm flipH="1" flipV="1">
             <a:off x="3381178" y="4323834"/>
+            <a:ext cx="333338" cy="5074"/>
+          </a:xfrm>
+          <a:prstGeom prst="line">
+            <a:avLst/>
+          </a:prstGeom>
+          <a:ln w="15875">
+            <a:solidFill>
+              <a:schemeClr val="tx1"/>
+            </a:solidFill>
+          </a:ln>
+          <a:effectLst/>
+        </p:spPr>
+        <p:style>
+          <a:lnRef idx="2">
+            <a:schemeClr val="accent1"/>
+          </a:lnRef>
+          <a:fillRef idx="0">
+            <a:schemeClr val="accent1"/>
+          </a:fillRef>
+          <a:effectRef idx="1">
+            <a:schemeClr val="accent1"/>
+          </a:effectRef>
+          <a:fontRef idx="minor">
+            <a:schemeClr val="tx1"/>
+          </a:fontRef>
+        </p:style>
+      </p:cxnSp>
+      <p:sp>
+        <p:nvSpPr>
+          <p:cNvPr id="82" name="Rectangle 81"/>
+          <p:cNvSpPr/>
+          <p:nvPr/>
+        </p:nvSpPr>
+        <p:spPr>
+          <a:xfrm rot="5400000">
+            <a:off x="7439209" y="4553985"/>
+            <a:ext cx="353923" cy="122296"/>
+          </a:xfrm>
+          <a:prstGeom prst="rect">
+            <a:avLst/>
+          </a:prstGeom>
+          <a:solidFill>
+            <a:schemeClr val="accent6"/>
+          </a:solidFill>
+          <a:ln>
+            <a:noFill/>
+          </a:ln>
+          <a:effectLst/>
+        </p:spPr>
+        <p:style>
+          <a:lnRef idx="1">
+            <a:schemeClr val="accent1"/>
+          </a:lnRef>
+          <a:fillRef idx="3">
+            <a:schemeClr val="accent1"/>
+          </a:fillRef>
+          <a:effectRef idx="2">
+            <a:schemeClr val="accent1"/>
+          </a:effectRef>
+          <a:fontRef idx="minor">
+            <a:schemeClr val="lt1"/>
+          </a:fontRef>
+        </p:style>
+        <p:txBody>
+          <a:bodyPr lIns="0" tIns="0" rIns="0" bIns="0" rtlCol="0" anchor="ctr"/>
+          <a:lstStyle/>
+          <a:p>
+            <a:pPr algn="ctr"/>
+            <a:r>
+              <a:rPr lang="en-US" sz="900" dirty="0" smtClean="0">
+                <a:solidFill>
+                  <a:schemeClr val="tx1"/>
+                </a:solidFill>
+                <a:latin typeface="Franklin Gothic Book"/>
+                <a:cs typeface="Franklin Gothic Book"/>
+              </a:rPr>
+              <a:t>swp52</a:t>
+            </a:r>
+            <a:endParaRPr lang="en-US" sz="900" dirty="0">
+              <a:solidFill>
+                <a:schemeClr val="tx1"/>
+              </a:solidFill>
+              <a:latin typeface="Franklin Gothic Book"/>
+              <a:cs typeface="Franklin Gothic Book"/>
+            </a:endParaRPr>
+          </a:p>
+        </p:txBody>
+      </p:sp>
+      <p:sp>
+        <p:nvSpPr>
+          <p:cNvPr id="84" name="Rectangle 83"/>
+          <p:cNvSpPr/>
+          <p:nvPr/>
+        </p:nvSpPr>
+        <p:spPr>
+          <a:xfrm rot="16200000">
+            <a:off x="7894843" y="4559060"/>
+            <a:ext cx="353923" cy="122296"/>
+          </a:xfrm>
+          <a:prstGeom prst="rect">
+            <a:avLst/>
+          </a:prstGeom>
+          <a:solidFill>
+            <a:schemeClr val="accent6"/>
+          </a:solidFill>
+          <a:ln>
+            <a:noFill/>
+          </a:ln>
+          <a:effectLst/>
+        </p:spPr>
+        <p:style>
+          <a:lnRef idx="1">
+            <a:schemeClr val="accent1"/>
+          </a:lnRef>
+          <a:fillRef idx="3">
+            <a:schemeClr val="accent1"/>
+          </a:fillRef>
+          <a:effectRef idx="2">
+            <a:schemeClr val="accent1"/>
+          </a:effectRef>
+          <a:fontRef idx="minor">
+            <a:schemeClr val="lt1"/>
+          </a:fontRef>
+        </p:style>
+        <p:txBody>
+          <a:bodyPr lIns="0" tIns="0" rIns="0" bIns="0" rtlCol="0" anchor="ctr"/>
+          <a:lstStyle/>
+          <a:p>
+            <a:pPr algn="ctr"/>
+            <a:r>
+              <a:rPr lang="en-US" sz="900" dirty="0" smtClean="0">
+                <a:solidFill>
+                  <a:schemeClr val="tx1"/>
+                </a:solidFill>
+                <a:latin typeface="Franklin Gothic Book"/>
+                <a:cs typeface="Franklin Gothic Book"/>
+              </a:rPr>
+              <a:t>swp52</a:t>
+            </a:r>
+            <a:endParaRPr lang="en-US" sz="900" dirty="0">
+              <a:solidFill>
+                <a:schemeClr val="tx1"/>
+              </a:solidFill>
+              <a:latin typeface="Franklin Gothic Book"/>
+              <a:cs typeface="Franklin Gothic Book"/>
+            </a:endParaRPr>
+          </a:p>
+        </p:txBody>
+      </p:sp>
+      <p:cxnSp>
+        <p:nvCxnSpPr>
+          <p:cNvPr id="85" name="Straight Connector 84"/>
+          <p:cNvCxnSpPr/>
+          <p:nvPr/>
+        </p:nvCxnSpPr>
+        <p:spPr>
+          <a:xfrm flipH="1" flipV="1">
+            <a:off x="7677319" y="4615134"/>
+            <a:ext cx="333338" cy="5074"/>
+          </a:xfrm>
+          <a:prstGeom prst="line">
+            <a:avLst/>
+          </a:prstGeom>
+          <a:ln w="15875">
+            <a:solidFill>
+              <a:schemeClr val="tx1"/>
+            </a:solidFill>
+          </a:ln>
+          <a:effectLst/>
+        </p:spPr>
+        <p:style>
+          <a:lnRef idx="2">
+            <a:schemeClr val="accent1"/>
+          </a:lnRef>
+          <a:fillRef idx="0">
+            <a:schemeClr val="accent1"/>
+          </a:fillRef>
+          <a:effectRef idx="1">
+            <a:schemeClr val="accent1"/>
+          </a:effectRef>
+          <a:fontRef idx="minor">
+            <a:schemeClr val="tx1"/>
+          </a:fontRef>
+        </p:style>
+      </p:cxnSp>
+      <p:sp>
+        <p:nvSpPr>
+          <p:cNvPr id="87" name="Rectangle 86"/>
+          <p:cNvSpPr/>
+          <p:nvPr/>
+        </p:nvSpPr>
+        <p:spPr>
+          <a:xfrm rot="5400000">
+            <a:off x="7441134" y="4116077"/>
+            <a:ext cx="353923" cy="122296"/>
+          </a:xfrm>
+          <a:prstGeom prst="rect">
+            <a:avLst/>
+          </a:prstGeom>
+          <a:solidFill>
+            <a:schemeClr val="accent6"/>
+          </a:solidFill>
+          <a:ln>
+            <a:noFill/>
+          </a:ln>
+          <a:effectLst/>
+        </p:spPr>
+        <p:style>
+          <a:lnRef idx="1">
+            <a:schemeClr val="accent1"/>
+          </a:lnRef>
+          <a:fillRef idx="3">
+            <a:schemeClr val="accent1"/>
+          </a:fillRef>
+          <a:effectRef idx="2">
+            <a:schemeClr val="accent1"/>
+          </a:effectRef>
+          <a:fontRef idx="minor">
+            <a:schemeClr val="lt1"/>
+          </a:fontRef>
+        </p:style>
+        <p:txBody>
+          <a:bodyPr lIns="0" tIns="0" rIns="0" bIns="0" rtlCol="0" anchor="ctr"/>
+          <a:lstStyle/>
+          <a:p>
+            <a:pPr algn="ctr"/>
+            <a:r>
+              <a:rPr lang="en-US" sz="900" dirty="0" smtClean="0">
+                <a:solidFill>
+                  <a:schemeClr val="tx1"/>
+                </a:solidFill>
+                <a:latin typeface="Franklin Gothic Book"/>
+                <a:cs typeface="Franklin Gothic Book"/>
+              </a:rPr>
+              <a:t>swp51</a:t>
+            </a:r>
+            <a:endParaRPr lang="en-US" sz="900" dirty="0">
+              <a:solidFill>
+                <a:schemeClr val="tx1"/>
+              </a:solidFill>
+              <a:latin typeface="Franklin Gothic Book"/>
+              <a:cs typeface="Franklin Gothic Book"/>
+            </a:endParaRPr>
+          </a:p>
+        </p:txBody>
+      </p:sp>
+      <p:sp>
+        <p:nvSpPr>
+          <p:cNvPr id="88" name="Rectangle 87"/>
+          <p:cNvSpPr/>
+          <p:nvPr/>
+        </p:nvSpPr>
+        <p:spPr>
+          <a:xfrm rot="16200000">
+            <a:off x="7896768" y="4121152"/>
+            <a:ext cx="353923" cy="122296"/>
+          </a:xfrm>
+          <a:prstGeom prst="rect">
+            <a:avLst/>
+          </a:prstGeom>
+          <a:solidFill>
+            <a:schemeClr val="accent6"/>
+          </a:solidFill>
+          <a:ln>
+            <a:noFill/>
+          </a:ln>
+          <a:effectLst/>
+        </p:spPr>
+        <p:style>
+          <a:lnRef idx="1">
+            <a:schemeClr val="accent1"/>
+          </a:lnRef>
+          <a:fillRef idx="3">
+            <a:schemeClr val="accent1"/>
+          </a:fillRef>
+          <a:effectRef idx="2">
+            <a:schemeClr val="accent1"/>
+          </a:effectRef>
+          <a:fontRef idx="minor">
+            <a:schemeClr val="lt1"/>
+          </a:fontRef>
+        </p:style>
+        <p:txBody>
+          <a:bodyPr lIns="0" tIns="0" rIns="0" bIns="0" rtlCol="0" anchor="ctr"/>
+          <a:lstStyle/>
+          <a:p>
+            <a:pPr algn="ctr"/>
+            <a:r>
+              <a:rPr lang="en-US" sz="900" dirty="0" smtClean="0">
+                <a:solidFill>
+                  <a:schemeClr val="tx1"/>
+                </a:solidFill>
+                <a:latin typeface="Franklin Gothic Book"/>
+                <a:cs typeface="Franklin Gothic Book"/>
+              </a:rPr>
+              <a:t>swp51</a:t>
+            </a:r>
+            <a:endParaRPr lang="en-US" sz="900" dirty="0">
+              <a:solidFill>
+                <a:schemeClr val="tx1"/>
+              </a:solidFill>
+              <a:latin typeface="Franklin Gothic Book"/>
+              <a:cs typeface="Franklin Gothic Book"/>
+            </a:endParaRPr>
+          </a:p>
+        </p:txBody>
+      </p:sp>
+      <p:cxnSp>
+        <p:nvCxnSpPr>
+          <p:cNvPr id="90" name="Straight Connector 89"/>
+          <p:cNvCxnSpPr/>
+          <p:nvPr/>
+        </p:nvCxnSpPr>
+        <p:spPr>
+          <a:xfrm flipH="1" flipV="1">
+            <a:off x="7679244" y="4177226"/>
             <a:ext cx="333338" cy="5074"/>
           </a:xfrm>
           <a:prstGeom prst="line">

</xml_diff>